<commit_message>
Add implementation for version 2
</commit_message>
<xml_diff>
--- a/out/slides_ver_1.pptx
+++ b/out/slides_ver_1.pptx
@@ -3169,31 +3169,6 @@
           <a:chExt cx="0" cy="0"/>
         </a:xfrm>
       </p:grpSpPr>
-      <p:sp>
-        <p:nvSpPr>
-          <p:cNvPr id="2" name="Title 1"/>
-          <p:cNvSpPr>
-            <a:spLocks noGrp="1"/>
-          </p:cNvSpPr>
-          <p:nvPr>
-            <p:ph type="title"/>
-          </p:nvPr>
-        </p:nvSpPr>
-        <p:spPr/>
-        <p:txBody>
-          <a:bodyPr/>
-          <a:lstStyle/>
-          <a:p>
-            <a:pPr lvl="0" indent="0" marL="0">
-              <a:buNone/>
-            </a:pPr>
-            <a:r>
-              <a:rPr/>
-              <a:t>мини-печь StarWind</a:t>
-            </a:r>
-          </a:p>
-        </p:txBody>
-      </p:sp>
       <p:sp>
         <p:nvSpPr>
           <p:cNvPr id="3" name="Content Placeholder 2"/>

</xml_diff>